<commit_message>
Presentaties + PayPal in WooCommerce
</commit_message>
<xml_diff>
--- a/new_technology/Wordpress - WooCommerce.pptx
+++ b/new_technology/Wordpress - WooCommerce.pptx
@@ -5,7 +5,7 @@
     <p:sldMasterId id="2147483660" r:id="rId1"/>
   </p:sldMasterIdLst>
   <p:notesMasterIdLst>
-    <p:notesMasterId r:id="rId36"/>
+    <p:notesMasterId r:id="rId29"/>
   </p:notesMasterIdLst>
   <p:sldIdLst>
     <p:sldId id="256" r:id="rId2"/>
@@ -35,13 +35,6 @@
     <p:sldId id="264" r:id="rId26"/>
     <p:sldId id="286" r:id="rId27"/>
     <p:sldId id="294" r:id="rId28"/>
-    <p:sldId id="295" r:id="rId29"/>
-    <p:sldId id="296" r:id="rId30"/>
-    <p:sldId id="281" r:id="rId31"/>
-    <p:sldId id="282" r:id="rId32"/>
-    <p:sldId id="268" r:id="rId33"/>
-    <p:sldId id="269" r:id="rId34"/>
-    <p:sldId id="265" r:id="rId35"/>
   </p:sldIdLst>
   <p:sldSz cx="12192000" cy="6858000"/>
   <p:notesSz cx="6858000" cy="9144000"/>
@@ -230,7 +223,7 @@
           <a:p>
             <a:fld id="{30EE4EB7-2E26-49B8-8006-3D54FC956F81}" type="datetimeFigureOut">
               <a:rPr lang="nl-BE" smtClean="0"/>
-              <a:t>10/11/2016</a:t>
+              <a:t>11/11/2016</a:t>
             </a:fld>
             <a:endParaRPr lang="nl-BE"/>
           </a:p>
@@ -2332,7 +2325,7 @@
           <a:p>
             <a:fld id="{A9D523DF-0EA4-4117-A99B-D3A7F1E0B22C}" type="datetimeFigureOut">
               <a:rPr lang="nl-BE" smtClean="0"/>
-              <a:t>10/11/2016</a:t>
+              <a:t>11/11/2016</a:t>
             </a:fld>
             <a:endParaRPr lang="nl-BE"/>
           </a:p>
@@ -2583,7 +2576,7 @@
           <a:p>
             <a:fld id="{A9D523DF-0EA4-4117-A99B-D3A7F1E0B22C}" type="datetimeFigureOut">
               <a:rPr lang="nl-BE" smtClean="0"/>
-              <a:t>10/11/2016</a:t>
+              <a:t>11/11/2016</a:t>
             </a:fld>
             <a:endParaRPr lang="nl-BE"/>
           </a:p>
@@ -2897,7 +2890,7 @@
           <a:p>
             <a:fld id="{A9D523DF-0EA4-4117-A99B-D3A7F1E0B22C}" type="datetimeFigureOut">
               <a:rPr lang="nl-BE" smtClean="0"/>
-              <a:t>10/11/2016</a:t>
+              <a:t>11/11/2016</a:t>
             </a:fld>
             <a:endParaRPr lang="nl-BE"/>
           </a:p>
@@ -3238,7 +3231,7 @@
           <a:p>
             <a:fld id="{A9D523DF-0EA4-4117-A99B-D3A7F1E0B22C}" type="datetimeFigureOut">
               <a:rPr lang="nl-BE" smtClean="0"/>
-              <a:t>10/11/2016</a:t>
+              <a:t>11/11/2016</a:t>
             </a:fld>
             <a:endParaRPr lang="nl-BE"/>
           </a:p>
@@ -3552,7 +3545,7 @@
           <a:p>
             <a:fld id="{A9D523DF-0EA4-4117-A99B-D3A7F1E0B22C}" type="datetimeFigureOut">
               <a:rPr lang="nl-BE" smtClean="0"/>
-              <a:t>10/11/2016</a:t>
+              <a:t>11/11/2016</a:t>
             </a:fld>
             <a:endParaRPr lang="nl-BE"/>
           </a:p>
@@ -3945,7 +3938,7 @@
           <a:p>
             <a:fld id="{A9D523DF-0EA4-4117-A99B-D3A7F1E0B22C}" type="datetimeFigureOut">
               <a:rPr lang="nl-BE" smtClean="0"/>
-              <a:t>10/11/2016</a:t>
+              <a:t>11/11/2016</a:t>
             </a:fld>
             <a:endParaRPr lang="nl-BE"/>
           </a:p>
@@ -4115,7 +4108,7 @@
           <a:p>
             <a:fld id="{A9D523DF-0EA4-4117-A99B-D3A7F1E0B22C}" type="datetimeFigureOut">
               <a:rPr lang="nl-BE" smtClean="0"/>
-              <a:t>10/11/2016</a:t>
+              <a:t>11/11/2016</a:t>
             </a:fld>
             <a:endParaRPr lang="nl-BE"/>
           </a:p>
@@ -4295,7 +4288,7 @@
           <a:p>
             <a:fld id="{A9D523DF-0EA4-4117-A99B-D3A7F1E0B22C}" type="datetimeFigureOut">
               <a:rPr lang="nl-BE" smtClean="0"/>
-              <a:t>10/11/2016</a:t>
+              <a:t>11/11/2016</a:t>
             </a:fld>
             <a:endParaRPr lang="nl-BE"/>
           </a:p>
@@ -4471,7 +4464,7 @@
           <a:p>
             <a:fld id="{A9D523DF-0EA4-4117-A99B-D3A7F1E0B22C}" type="datetimeFigureOut">
               <a:rPr lang="nl-BE" smtClean="0"/>
-              <a:t>10/11/2016</a:t>
+              <a:t>11/11/2016</a:t>
             </a:fld>
             <a:endParaRPr lang="nl-BE"/>
           </a:p>
@@ -4718,7 +4711,7 @@
           <a:p>
             <a:fld id="{A9D523DF-0EA4-4117-A99B-D3A7F1E0B22C}" type="datetimeFigureOut">
               <a:rPr lang="nl-BE" smtClean="0"/>
-              <a:t>10/11/2016</a:t>
+              <a:t>11/11/2016</a:t>
             </a:fld>
             <a:endParaRPr lang="nl-BE"/>
           </a:p>
@@ -4950,7 +4943,7 @@
           <a:p>
             <a:fld id="{A9D523DF-0EA4-4117-A99B-D3A7F1E0B22C}" type="datetimeFigureOut">
               <a:rPr lang="nl-BE" smtClean="0"/>
-              <a:t>10/11/2016</a:t>
+              <a:t>11/11/2016</a:t>
             </a:fld>
             <a:endParaRPr lang="nl-BE"/>
           </a:p>
@@ -5324,7 +5317,7 @@
           <a:p>
             <a:fld id="{A9D523DF-0EA4-4117-A99B-D3A7F1E0B22C}" type="datetimeFigureOut">
               <a:rPr lang="nl-BE" smtClean="0"/>
-              <a:t>10/11/2016</a:t>
+              <a:t>11/11/2016</a:t>
             </a:fld>
             <a:endParaRPr lang="nl-BE"/>
           </a:p>
@@ -5447,7 +5440,7 @@
           <a:p>
             <a:fld id="{A9D523DF-0EA4-4117-A99B-D3A7F1E0B22C}" type="datetimeFigureOut">
               <a:rPr lang="nl-BE" smtClean="0"/>
-              <a:t>10/11/2016</a:t>
+              <a:t>11/11/2016</a:t>
             </a:fld>
             <a:endParaRPr lang="nl-BE"/>
           </a:p>
@@ -5542,7 +5535,7 @@
           <a:p>
             <a:fld id="{A9D523DF-0EA4-4117-A99B-D3A7F1E0B22C}" type="datetimeFigureOut">
               <a:rPr lang="nl-BE" smtClean="0"/>
-              <a:t>10/11/2016</a:t>
+              <a:t>11/11/2016</a:t>
             </a:fld>
             <a:endParaRPr lang="nl-BE"/>
           </a:p>
@@ -5797,7 +5790,7 @@
           <a:p>
             <a:fld id="{A9D523DF-0EA4-4117-A99B-D3A7F1E0B22C}" type="datetimeFigureOut">
               <a:rPr lang="nl-BE" smtClean="0"/>
-              <a:t>10/11/2016</a:t>
+              <a:t>11/11/2016</a:t>
             </a:fld>
             <a:endParaRPr lang="nl-BE"/>
           </a:p>
@@ -6060,7 +6053,7 @@
           <a:p>
             <a:fld id="{A9D523DF-0EA4-4117-A99B-D3A7F1E0B22C}" type="datetimeFigureOut">
               <a:rPr lang="nl-BE" smtClean="0"/>
-              <a:t>10/11/2016</a:t>
+              <a:t>11/11/2016</a:t>
             </a:fld>
             <a:endParaRPr lang="nl-BE"/>
           </a:p>
@@ -6803,7 +6796,7 @@
           <a:p>
             <a:fld id="{A9D523DF-0EA4-4117-A99B-D3A7F1E0B22C}" type="datetimeFigureOut">
               <a:rPr lang="nl-BE" smtClean="0"/>
-              <a:t>10/11/2016</a:t>
+              <a:t>11/11/2016</a:t>
             </a:fld>
             <a:endParaRPr lang="nl-BE"/>
           </a:p>
@@ -12147,17 +12140,12 @@
               <a:rPr lang="nl-BE" sz="2000" dirty="0" smtClean="0"/>
               <a:t>Standaard geïmplementeerd:</a:t>
             </a:r>
-            <a:endParaRPr lang="nl-BE" sz="2000" dirty="0" smtClean="0"/>
           </a:p>
           <a:p>
             <a:pPr lvl="1"/>
             <a:r>
               <a:rPr lang="nl-BE" sz="1800" dirty="0" smtClean="0"/>
-              <a:t>Cash on </a:t>
-            </a:r>
-            <a:r>
-              <a:rPr lang="nl-BE" sz="1800" dirty="0" smtClean="0"/>
-              <a:t>delivery</a:t>
+              <a:t>Cash on delivery</a:t>
             </a:r>
           </a:p>
           <a:p>
@@ -12178,7 +12166,6 @@
               <a:rPr lang="nl-BE" sz="1800" dirty="0" smtClean="0"/>
               <a:t>BACS (bankoverschrijvingen)</a:t>
             </a:r>
-            <a:endParaRPr lang="nl-BE" sz="1800" dirty="0" smtClean="0"/>
           </a:p>
           <a:p>
             <a:pPr lvl="1"/>
@@ -12196,19 +12183,7 @@
             </a:r>
             <a:r>
               <a:rPr lang="nl-BE" sz="1800" dirty="0" smtClean="0"/>
-              <a:t> </a:t>
-            </a:r>
-            <a:r>
-              <a:rPr lang="nl-BE" sz="1800" dirty="0" smtClean="0"/>
-              <a:t>business account </a:t>
-            </a:r>
-            <a:r>
-              <a:rPr lang="nl-BE" sz="1800" dirty="0" smtClean="0"/>
-              <a:t>vereist</a:t>
-            </a:r>
-            <a:r>
-              <a:rPr lang="nl-BE" sz="1800" dirty="0" smtClean="0"/>
-              <a:t>) (</a:t>
+              <a:t> business account vereist) (</a:t>
             </a:r>
             <a:r>
               <a:rPr lang="nl-BE" sz="1800" dirty="0" err="1" smtClean="0"/>
@@ -12266,7 +12241,6 @@
               <a:rPr lang="nl-BE" sz="1800" dirty="0" smtClean="0"/>
               <a:t> (credit card)</a:t>
             </a:r>
-            <a:endParaRPr lang="nl-BE" sz="1800" dirty="0" smtClean="0"/>
           </a:p>
           <a:p>
             <a:endParaRPr lang="nl-BE" sz="2000" dirty="0" smtClean="0"/>
@@ -13729,11 +13703,7 @@
             <a:pPr lvl="1"/>
             <a:r>
               <a:rPr lang="nl-BE" sz="1800" dirty="0" smtClean="0"/>
-              <a:t>Opzetten </a:t>
-            </a:r>
-            <a:r>
-              <a:rPr lang="nl-BE" sz="1800" dirty="0" smtClean="0"/>
-              <a:t>per regio (land, staat, postcode, …)</a:t>
+              <a:t>Opzetten per regio (land, staat, postcode, …)</a:t>
             </a:r>
           </a:p>
           <a:p>
@@ -13758,22 +13728,14 @@
             <a:pPr lvl="1"/>
             <a:r>
               <a:rPr lang="nl-BE" sz="1800" dirty="0" smtClean="0"/>
-              <a:t>Bepalen </a:t>
-            </a:r>
+              <a:t>Bepalen of het voor het hele winkelwagentje geldt, of per product</a:t>
+            </a:r>
+          </a:p>
+          <a:p>
+            <a:pPr lvl="1"/>
             <a:r>
               <a:rPr lang="nl-BE" sz="1800" dirty="0" smtClean="0"/>
-              <a:t>of het voor het hele winkelwagentje geldt, of per product</a:t>
-            </a:r>
-          </a:p>
-          <a:p>
-            <a:pPr lvl="1"/>
-            <a:r>
-              <a:rPr lang="nl-BE" sz="1800" dirty="0" smtClean="0"/>
-              <a:t>Bepalen of het een percentage of vast bedrag </a:t>
-            </a:r>
-            <a:r>
-              <a:rPr lang="nl-BE" sz="1800" dirty="0" smtClean="0"/>
-              <a:t>is</a:t>
+              <a:t>Bepalen of het een percentage of vast bedrag is</a:t>
             </a:r>
             <a:endParaRPr lang="nl-BE" sz="1800" dirty="0"/>
           </a:p>
@@ -16449,11 +16411,7 @@
             </a:r>
             <a:r>
               <a:rPr lang="nl-BE" sz="1800" dirty="0" smtClean="0"/>
-              <a:t> (alles kan aangepast worden op 1 plaats</a:t>
-            </a:r>
-            <a:r>
-              <a:rPr lang="nl-BE" sz="1800" dirty="0" smtClean="0"/>
-              <a:t>)</a:t>
+              <a:t> (alles kan aangepast worden op 1 plaats)</a:t>
             </a:r>
             <a:endParaRPr lang="nl-BE" sz="1600" dirty="0" smtClean="0"/>
           </a:p>
@@ -16533,11 +16491,7 @@
             </a:r>
             <a:r>
               <a:rPr lang="nl-BE" sz="2000" dirty="0" smtClean="0"/>
-              <a:t> </a:t>
-            </a:r>
-            <a:r>
-              <a:rPr lang="nl-BE" sz="2000" dirty="0" smtClean="0"/>
-              <a:t>(ook </a:t>
+              <a:t> (ook </a:t>
             </a:r>
             <a:r>
               <a:rPr lang="nl-BE" sz="2000" dirty="0" err="1" smtClean="0"/>
@@ -16563,11 +16517,7 @@
             </a:r>
             <a:r>
               <a:rPr lang="nl-BE" sz="2000" dirty="0" smtClean="0"/>
-              <a:t> </a:t>
-            </a:r>
-            <a:r>
-              <a:rPr lang="nl-BE" sz="2000" dirty="0" smtClean="0"/>
-              <a:t>maar betalend…</a:t>
+              <a:t> maar betalend…</a:t>
             </a:r>
           </a:p>
           <a:p>
@@ -17315,11 +17265,7 @@
             </a:r>
             <a:r>
               <a:rPr lang="nl-BE" sz="2000" dirty="0" smtClean="0"/>
-              <a:t> (reviews</a:t>
-            </a:r>
-            <a:r>
-              <a:rPr lang="nl-BE" sz="2000" dirty="0" smtClean="0"/>
-              <a:t>))</a:t>
+              <a:t> (reviews))</a:t>
             </a:r>
             <a:endParaRPr lang="nl-BE" sz="2000" dirty="0"/>
           </a:p>
@@ -17426,170 +17372,13 @@
     </p:spTree>
     <p:extLst>
       <p:ext uri="{BB962C8B-B14F-4D97-AF65-F5344CB8AC3E}">
-        <p14:creationId xmlns:p14="http://schemas.microsoft.com/office/powerpoint/2010/main" val="1009187045"/>
+        <p14:creationId xmlns:p14="http://schemas.microsoft.com/office/powerpoint/2010/main" val="1310473736"/>
       </p:ext>
     </p:extLst>
   </p:cSld>
   <p:clrMapOvr>
     <a:masterClrMapping/>
   </p:clrMapOvr>
-  <p:timing>
-    <p:tnLst>
-      <p:par>
-        <p:cTn id="1" dur="indefinite" restart="never" nodeType="tmRoot"/>
-      </p:par>
-    </p:tnLst>
-  </p:timing>
-</p:sld>
-</file>
-
-<file path=ppt/slides/slide28.xml><?xml version="1.0" encoding="utf-8"?>
-<p:sld xmlns:a="http://schemas.openxmlformats.org/drawingml/2006/main" xmlns:r="http://schemas.openxmlformats.org/officeDocument/2006/relationships" xmlns:p="http://schemas.openxmlformats.org/presentationml/2006/main">
-  <p:cSld>
-    <p:spTree>
-      <p:nvGrpSpPr>
-        <p:cNvPr id="1" name=""/>
-        <p:cNvGrpSpPr/>
-        <p:nvPr/>
-      </p:nvGrpSpPr>
-      <p:grpSpPr>
-        <a:xfrm>
-          <a:off x="0" y="0"/>
-          <a:ext cx="0" cy="0"/>
-          <a:chOff x="0" y="0"/>
-          <a:chExt cx="0" cy="0"/>
-        </a:xfrm>
-      </p:grpSpPr>
-      <p:sp>
-        <p:nvSpPr>
-          <p:cNvPr id="2" name="Titel 1"/>
-          <p:cNvSpPr>
-            <a:spLocks noGrp="1"/>
-          </p:cNvSpPr>
-          <p:nvPr>
-            <p:ph type="title"/>
-          </p:nvPr>
-        </p:nvSpPr>
-        <p:spPr/>
-        <p:txBody>
-          <a:bodyPr/>
-          <a:lstStyle/>
-          <a:p>
-            <a:endParaRPr lang="nl-BE"/>
-          </a:p>
-        </p:txBody>
-      </p:sp>
-      <p:sp>
-        <p:nvSpPr>
-          <p:cNvPr id="3" name="Tijdelijke aanduiding voor inhoud 2"/>
-          <p:cNvSpPr>
-            <a:spLocks noGrp="1"/>
-          </p:cNvSpPr>
-          <p:nvPr>
-            <p:ph idx="1"/>
-          </p:nvPr>
-        </p:nvSpPr>
-        <p:spPr/>
-        <p:txBody>
-          <a:bodyPr/>
-          <a:lstStyle/>
-          <a:p>
-            <a:endParaRPr lang="nl-BE"/>
-          </a:p>
-        </p:txBody>
-      </p:sp>
-    </p:spTree>
-    <p:extLst>
-      <p:ext uri="{BB962C8B-B14F-4D97-AF65-F5344CB8AC3E}">
-        <p14:creationId xmlns:p14="http://schemas.microsoft.com/office/powerpoint/2010/main" val="3792477028"/>
-      </p:ext>
-    </p:extLst>
-  </p:cSld>
-  <p:clrMapOvr>
-    <a:masterClrMapping/>
-  </p:clrMapOvr>
-  <p:timing>
-    <p:tnLst>
-      <p:par>
-        <p:cTn id="1" dur="indefinite" restart="never" nodeType="tmRoot"/>
-      </p:par>
-    </p:tnLst>
-  </p:timing>
-</p:sld>
-</file>
-
-<file path=ppt/slides/slide29.xml><?xml version="1.0" encoding="utf-8"?>
-<p:sld xmlns:a="http://schemas.openxmlformats.org/drawingml/2006/main" xmlns:r="http://schemas.openxmlformats.org/officeDocument/2006/relationships" xmlns:p="http://schemas.openxmlformats.org/presentationml/2006/main">
-  <p:cSld>
-    <p:spTree>
-      <p:nvGrpSpPr>
-        <p:cNvPr id="1" name=""/>
-        <p:cNvGrpSpPr/>
-        <p:nvPr/>
-      </p:nvGrpSpPr>
-      <p:grpSpPr>
-        <a:xfrm>
-          <a:off x="0" y="0"/>
-          <a:ext cx="0" cy="0"/>
-          <a:chOff x="0" y="0"/>
-          <a:chExt cx="0" cy="0"/>
-        </a:xfrm>
-      </p:grpSpPr>
-      <p:sp>
-        <p:nvSpPr>
-          <p:cNvPr id="2" name="Titel 1"/>
-          <p:cNvSpPr>
-            <a:spLocks noGrp="1"/>
-          </p:cNvSpPr>
-          <p:nvPr>
-            <p:ph type="title"/>
-          </p:nvPr>
-        </p:nvSpPr>
-        <p:spPr/>
-        <p:txBody>
-          <a:bodyPr/>
-          <a:lstStyle/>
-          <a:p>
-            <a:endParaRPr lang="nl-BE"/>
-          </a:p>
-        </p:txBody>
-      </p:sp>
-      <p:sp>
-        <p:nvSpPr>
-          <p:cNvPr id="3" name="Tijdelijke aanduiding voor inhoud 2"/>
-          <p:cNvSpPr>
-            <a:spLocks noGrp="1"/>
-          </p:cNvSpPr>
-          <p:nvPr>
-            <p:ph idx="1"/>
-          </p:nvPr>
-        </p:nvSpPr>
-        <p:spPr/>
-        <p:txBody>
-          <a:bodyPr/>
-          <a:lstStyle/>
-          <a:p>
-            <a:endParaRPr lang="nl-BE"/>
-          </a:p>
-        </p:txBody>
-      </p:sp>
-    </p:spTree>
-    <p:extLst>
-      <p:ext uri="{BB962C8B-B14F-4D97-AF65-F5344CB8AC3E}">
-        <p14:creationId xmlns:p14="http://schemas.microsoft.com/office/powerpoint/2010/main" val="2958468963"/>
-      </p:ext>
-    </p:extLst>
-  </p:cSld>
-  <p:clrMapOvr>
-    <a:masterClrMapping/>
-  </p:clrMapOvr>
-  <p:timing>
-    <p:tnLst>
-      <p:par>
-        <p:cTn id="1" dur="indefinite" restart="never" nodeType="tmRoot"/>
-      </p:par>
-    </p:tnLst>
-  </p:timing>
 </p:sld>
 </file>
 
@@ -17913,711 +17702,6 @@
             </p:seq>
           </p:childTnLst>
         </p:cTn>
-      </p:par>
-    </p:tnLst>
-  </p:timing>
-</p:sld>
-</file>
-
-<file path=ppt/slides/slide30.xml><?xml version="1.0" encoding="utf-8"?>
-<p:sld xmlns:a="http://schemas.openxmlformats.org/drawingml/2006/main" xmlns:r="http://schemas.openxmlformats.org/officeDocument/2006/relationships" xmlns:p="http://schemas.openxmlformats.org/presentationml/2006/main">
-  <p:cSld>
-    <p:spTree>
-      <p:nvGrpSpPr>
-        <p:cNvPr id="1" name=""/>
-        <p:cNvGrpSpPr/>
-        <p:nvPr/>
-      </p:nvGrpSpPr>
-      <p:grpSpPr>
-        <a:xfrm>
-          <a:off x="0" y="0"/>
-          <a:ext cx="0" cy="0"/>
-          <a:chOff x="0" y="0"/>
-          <a:chExt cx="0" cy="0"/>
-        </a:xfrm>
-      </p:grpSpPr>
-      <p:sp>
-        <p:nvSpPr>
-          <p:cNvPr id="2" name="Titel 1"/>
-          <p:cNvSpPr>
-            <a:spLocks noGrp="1"/>
-          </p:cNvSpPr>
-          <p:nvPr>
-            <p:ph type="title"/>
-          </p:nvPr>
-        </p:nvSpPr>
-        <p:spPr/>
-        <p:txBody>
-          <a:bodyPr/>
-          <a:lstStyle/>
-          <a:p>
-            <a:r>
-              <a:rPr lang="nl-BE" dirty="0" smtClean="0"/>
-              <a:t>Misschien nog te bespreken</a:t>
-            </a:r>
-            <a:endParaRPr lang="nl-BE" dirty="0"/>
-          </a:p>
-        </p:txBody>
-      </p:sp>
-      <p:sp>
-        <p:nvSpPr>
-          <p:cNvPr id="3" name="Tijdelijke aanduiding voor inhoud 2"/>
-          <p:cNvSpPr>
-            <a:spLocks noGrp="1"/>
-          </p:cNvSpPr>
-          <p:nvPr>
-            <p:ph idx="1"/>
-          </p:nvPr>
-        </p:nvSpPr>
-        <p:spPr/>
-        <p:txBody>
-          <a:bodyPr/>
-          <a:lstStyle/>
-          <a:p>
-            <a:r>
-              <a:rPr lang="nl-BE" dirty="0" err="1" smtClean="0"/>
-              <a:t>Taxes</a:t>
-            </a:r>
-            <a:endParaRPr lang="nl-BE" dirty="0" smtClean="0"/>
-          </a:p>
-          <a:p>
-            <a:r>
-              <a:rPr lang="nl-BE" dirty="0" err="1" smtClean="0"/>
-              <a:t>Shipping</a:t>
-            </a:r>
-            <a:r>
-              <a:rPr lang="nl-BE" dirty="0" smtClean="0"/>
-              <a:t> classes</a:t>
-            </a:r>
-          </a:p>
-          <a:p>
-            <a:r>
-              <a:rPr lang="nl-BE" dirty="0" smtClean="0"/>
-              <a:t>Import product images </a:t>
-            </a:r>
-            <a:r>
-              <a:rPr lang="nl-BE" dirty="0" err="1" smtClean="0"/>
-              <a:t>from</a:t>
-            </a:r>
-            <a:r>
-              <a:rPr lang="nl-BE" dirty="0" smtClean="0"/>
-              <a:t> computer </a:t>
-            </a:r>
-            <a:r>
-              <a:rPr lang="nl-BE" dirty="0" err="1" smtClean="0"/>
-              <a:t>location</a:t>
-            </a:r>
-            <a:endParaRPr lang="nl-BE" dirty="0"/>
-          </a:p>
-          <a:p>
-            <a:endParaRPr lang="nl-BE" dirty="0" smtClean="0"/>
-          </a:p>
-          <a:p>
-            <a:r>
-              <a:rPr lang="nl-BE" dirty="0" err="1" smtClean="0"/>
-              <a:t>Remove</a:t>
-            </a:r>
-            <a:r>
-              <a:rPr lang="nl-BE" dirty="0" smtClean="0"/>
-              <a:t> automatic </a:t>
-            </a:r>
-            <a:r>
-              <a:rPr lang="nl-BE" dirty="0" err="1" smtClean="0"/>
-              <a:t>related</a:t>
-            </a:r>
-            <a:r>
-              <a:rPr lang="nl-BE" dirty="0" smtClean="0"/>
-              <a:t> </a:t>
-            </a:r>
-            <a:r>
-              <a:rPr lang="nl-BE" dirty="0" err="1" smtClean="0"/>
-              <a:t>products</a:t>
-            </a:r>
-            <a:r>
-              <a:rPr lang="nl-BE" dirty="0"/>
-              <a:t> (</a:t>
-            </a:r>
-            <a:r>
-              <a:rPr lang="nl-BE" dirty="0">
-                <a:hlinkClick r:id="rId2"/>
-              </a:rPr>
-              <a:t>https://docs.woocommerce.com/document/remove-related-posts-output</a:t>
-            </a:r>
-            <a:r>
-              <a:rPr lang="nl-BE" dirty="0" smtClean="0">
-                <a:hlinkClick r:id="rId2"/>
-              </a:rPr>
-              <a:t>/</a:t>
-            </a:r>
-            <a:r>
-              <a:rPr lang="nl-BE" dirty="0" smtClean="0"/>
-              <a:t>)</a:t>
-            </a:r>
-          </a:p>
-          <a:p>
-            <a:r>
-              <a:rPr lang="nl-BE" dirty="0" smtClean="0"/>
-              <a:t>Tags</a:t>
-            </a:r>
-          </a:p>
-          <a:p>
-            <a:r>
-              <a:rPr lang="nl-BE" dirty="0" err="1" smtClean="0"/>
-              <a:t>Logout</a:t>
-            </a:r>
-            <a:r>
-              <a:rPr lang="nl-BE" dirty="0" smtClean="0"/>
-              <a:t> button </a:t>
-            </a:r>
-            <a:r>
-              <a:rPr lang="nl-BE" dirty="0" err="1" smtClean="0"/>
-              <a:t>rechtsbovenaan</a:t>
-            </a:r>
-            <a:r>
-              <a:rPr lang="nl-BE" dirty="0" smtClean="0"/>
-              <a:t> &gt; ok</a:t>
-            </a:r>
-          </a:p>
-          <a:p>
-            <a:r>
-              <a:rPr lang="nl-BE" dirty="0" smtClean="0"/>
-              <a:t>Order van </a:t>
-            </a:r>
-            <a:r>
-              <a:rPr lang="nl-BE" dirty="0" err="1" smtClean="0"/>
-              <a:t>downloadable</a:t>
-            </a:r>
-            <a:r>
-              <a:rPr lang="nl-BE" dirty="0" smtClean="0"/>
-              <a:t> product afhandelen</a:t>
-            </a:r>
-            <a:endParaRPr lang="nl-BE" dirty="0"/>
-          </a:p>
-        </p:txBody>
-      </p:sp>
-    </p:spTree>
-    <p:extLst>
-      <p:ext uri="{BB962C8B-B14F-4D97-AF65-F5344CB8AC3E}">
-        <p14:creationId xmlns:p14="http://schemas.microsoft.com/office/powerpoint/2010/main" val="3901404828"/>
-      </p:ext>
-    </p:extLst>
-  </p:cSld>
-  <p:clrMapOvr>
-    <a:masterClrMapping/>
-  </p:clrMapOvr>
-  <p:timing>
-    <p:tnLst>
-      <p:par>
-        <p:cTn id="1" dur="indefinite" restart="never" nodeType="tmRoot"/>
-      </p:par>
-    </p:tnLst>
-  </p:timing>
-</p:sld>
-</file>
-
-<file path=ppt/slides/slide31.xml><?xml version="1.0" encoding="utf-8"?>
-<p:sld xmlns:a="http://schemas.openxmlformats.org/drawingml/2006/main" xmlns:r="http://schemas.openxmlformats.org/officeDocument/2006/relationships" xmlns:p="http://schemas.openxmlformats.org/presentationml/2006/main">
-  <p:cSld>
-    <p:spTree>
-      <p:nvGrpSpPr>
-        <p:cNvPr id="1" name=""/>
-        <p:cNvGrpSpPr/>
-        <p:nvPr/>
-      </p:nvGrpSpPr>
-      <p:grpSpPr>
-        <a:xfrm>
-          <a:off x="0" y="0"/>
-          <a:ext cx="0" cy="0"/>
-          <a:chOff x="0" y="0"/>
-          <a:chExt cx="0" cy="0"/>
-        </a:xfrm>
-      </p:grpSpPr>
-      <p:sp>
-        <p:nvSpPr>
-          <p:cNvPr id="2" name="Titel 1"/>
-          <p:cNvSpPr>
-            <a:spLocks noGrp="1"/>
-          </p:cNvSpPr>
-          <p:nvPr>
-            <p:ph type="title"/>
-          </p:nvPr>
-        </p:nvSpPr>
-        <p:spPr/>
-        <p:txBody>
-          <a:bodyPr/>
-          <a:lstStyle/>
-          <a:p>
-            <a:endParaRPr lang="nl-BE"/>
-          </a:p>
-        </p:txBody>
-      </p:sp>
-      <p:sp>
-        <p:nvSpPr>
-          <p:cNvPr id="3" name="Tijdelijke aanduiding voor inhoud 2"/>
-          <p:cNvSpPr>
-            <a:spLocks noGrp="1"/>
-          </p:cNvSpPr>
-          <p:nvPr>
-            <p:ph idx="1"/>
-          </p:nvPr>
-        </p:nvSpPr>
-        <p:spPr/>
-        <p:txBody>
-          <a:bodyPr/>
-          <a:lstStyle/>
-          <a:p>
-            <a:endParaRPr lang="nl-BE"/>
-          </a:p>
-        </p:txBody>
-      </p:sp>
-    </p:spTree>
-    <p:extLst>
-      <p:ext uri="{BB962C8B-B14F-4D97-AF65-F5344CB8AC3E}">
-        <p14:creationId xmlns:p14="http://schemas.microsoft.com/office/powerpoint/2010/main" val="2624506105"/>
-      </p:ext>
-    </p:extLst>
-  </p:cSld>
-  <p:clrMapOvr>
-    <a:masterClrMapping/>
-  </p:clrMapOvr>
-  <p:timing>
-    <p:tnLst>
-      <p:par>
-        <p:cTn id="1" dur="indefinite" restart="never" nodeType="tmRoot"/>
-      </p:par>
-    </p:tnLst>
-  </p:timing>
-</p:sld>
-</file>
-
-<file path=ppt/slides/slide32.xml><?xml version="1.0" encoding="utf-8"?>
-<p:sld xmlns:a="http://schemas.openxmlformats.org/drawingml/2006/main" xmlns:r="http://schemas.openxmlformats.org/officeDocument/2006/relationships" xmlns:p="http://schemas.openxmlformats.org/presentationml/2006/main">
-  <p:cSld>
-    <p:spTree>
-      <p:nvGrpSpPr>
-        <p:cNvPr id="1" name=""/>
-        <p:cNvGrpSpPr/>
-        <p:nvPr/>
-      </p:nvGrpSpPr>
-      <p:grpSpPr>
-        <a:xfrm>
-          <a:off x="0" y="0"/>
-          <a:ext cx="0" cy="0"/>
-          <a:chOff x="0" y="0"/>
-          <a:chExt cx="0" cy="0"/>
-        </a:xfrm>
-      </p:grpSpPr>
-      <p:sp>
-        <p:nvSpPr>
-          <p:cNvPr id="2" name="Titel 1"/>
-          <p:cNvSpPr>
-            <a:spLocks noGrp="1"/>
-          </p:cNvSpPr>
-          <p:nvPr>
-            <p:ph type="title"/>
-          </p:nvPr>
-        </p:nvSpPr>
-        <p:spPr/>
-        <p:txBody>
-          <a:bodyPr/>
-          <a:lstStyle/>
-          <a:p>
-            <a:endParaRPr lang="nl-BE"/>
-          </a:p>
-        </p:txBody>
-      </p:sp>
-      <p:sp>
-        <p:nvSpPr>
-          <p:cNvPr id="3" name="Tijdelijke aanduiding voor inhoud 2"/>
-          <p:cNvSpPr>
-            <a:spLocks noGrp="1"/>
-          </p:cNvSpPr>
-          <p:nvPr>
-            <p:ph idx="1"/>
-          </p:nvPr>
-        </p:nvSpPr>
-        <p:spPr/>
-        <p:txBody>
-          <a:bodyPr/>
-          <a:lstStyle/>
-          <a:p>
-            <a:r>
-              <a:rPr lang="nl-BE" dirty="0" smtClean="0"/>
-              <a:t>Als je de weergave van je shop homepagina wil aanpassen:</a:t>
-            </a:r>
-          </a:p>
-          <a:p>
-            <a:pPr lvl="1"/>
-            <a:r>
-              <a:rPr lang="nl-BE" dirty="0" err="1" smtClean="0"/>
-              <a:t>Woocommerce</a:t>
-            </a:r>
-            <a:r>
-              <a:rPr lang="nl-BE" dirty="0" smtClean="0"/>
-              <a:t> &gt; </a:t>
-            </a:r>
-            <a:r>
-              <a:rPr lang="nl-BE" dirty="0" err="1" smtClean="0"/>
-              <a:t>settings</a:t>
-            </a:r>
-            <a:r>
-              <a:rPr lang="nl-BE" dirty="0" smtClean="0"/>
-              <a:t> &gt; </a:t>
-            </a:r>
-            <a:r>
-              <a:rPr lang="nl-BE" dirty="0" err="1" smtClean="0"/>
-              <a:t>products</a:t>
-            </a:r>
-            <a:r>
-              <a:rPr lang="nl-BE" dirty="0" smtClean="0"/>
-              <a:t> &gt; display</a:t>
-            </a:r>
-          </a:p>
-          <a:p>
-            <a:endParaRPr lang="nl-BE" dirty="0"/>
-          </a:p>
-          <a:p>
-            <a:r>
-              <a:rPr lang="nl-BE" dirty="0" smtClean="0"/>
-              <a:t>Tags instellen om producten </a:t>
-            </a:r>
-            <a:r>
-              <a:rPr lang="nl-BE" dirty="0" err="1" smtClean="0"/>
-              <a:t>zoekbaar</a:t>
-            </a:r>
-            <a:r>
-              <a:rPr lang="nl-BE" dirty="0" smtClean="0"/>
-              <a:t> te maken</a:t>
-            </a:r>
-          </a:p>
-          <a:p>
-            <a:endParaRPr lang="nl-BE" dirty="0"/>
-          </a:p>
-        </p:txBody>
-      </p:sp>
-    </p:spTree>
-    <p:extLst>
-      <p:ext uri="{BB962C8B-B14F-4D97-AF65-F5344CB8AC3E}">
-        <p14:creationId xmlns:p14="http://schemas.microsoft.com/office/powerpoint/2010/main" val="704007822"/>
-      </p:ext>
-    </p:extLst>
-  </p:cSld>
-  <p:clrMapOvr>
-    <a:masterClrMapping/>
-  </p:clrMapOvr>
-  <p:timing>
-    <p:tnLst>
-      <p:par>
-        <p:cTn id="1" dur="indefinite" restart="never" nodeType="tmRoot"/>
-      </p:par>
-    </p:tnLst>
-  </p:timing>
-</p:sld>
-</file>
-
-<file path=ppt/slides/slide33.xml><?xml version="1.0" encoding="utf-8"?>
-<p:sld xmlns:a="http://schemas.openxmlformats.org/drawingml/2006/main" xmlns:r="http://schemas.openxmlformats.org/officeDocument/2006/relationships" xmlns:p="http://schemas.openxmlformats.org/presentationml/2006/main">
-  <p:cSld>
-    <p:spTree>
-      <p:nvGrpSpPr>
-        <p:cNvPr id="1" name=""/>
-        <p:cNvGrpSpPr/>
-        <p:nvPr/>
-      </p:nvGrpSpPr>
-      <p:grpSpPr>
-        <a:xfrm>
-          <a:off x="0" y="0"/>
-          <a:ext cx="0" cy="0"/>
-          <a:chOff x="0" y="0"/>
-          <a:chExt cx="0" cy="0"/>
-        </a:xfrm>
-      </p:grpSpPr>
-      <p:sp>
-        <p:nvSpPr>
-          <p:cNvPr id="2" name="Titel 1"/>
-          <p:cNvSpPr>
-            <a:spLocks noGrp="1"/>
-          </p:cNvSpPr>
-          <p:nvPr>
-            <p:ph type="title"/>
-          </p:nvPr>
-        </p:nvSpPr>
-        <p:spPr/>
-        <p:txBody>
-          <a:bodyPr/>
-          <a:lstStyle/>
-          <a:p>
-            <a:endParaRPr lang="nl-BE"/>
-          </a:p>
-        </p:txBody>
-      </p:sp>
-      <p:sp>
-        <p:nvSpPr>
-          <p:cNvPr id="3" name="Tijdelijke aanduiding voor inhoud 2"/>
-          <p:cNvSpPr>
-            <a:spLocks noGrp="1"/>
-          </p:cNvSpPr>
-          <p:nvPr>
-            <p:ph idx="1"/>
-          </p:nvPr>
-        </p:nvSpPr>
-        <p:spPr/>
-        <p:txBody>
-          <a:bodyPr/>
-          <a:lstStyle/>
-          <a:p>
-            <a:endParaRPr lang="nl-BE"/>
-          </a:p>
-        </p:txBody>
-      </p:sp>
-      <p:pic>
-        <p:nvPicPr>
-          <p:cNvPr id="4" name="Afbeelding 3"/>
-          <p:cNvPicPr>
-            <a:picLocks noChangeAspect="1"/>
-          </p:cNvPicPr>
-          <p:nvPr/>
-        </p:nvPicPr>
-        <p:blipFill>
-          <a:blip r:embed="rId2"/>
-          <a:stretch>
-            <a:fillRect/>
-          </a:stretch>
-        </p:blipFill>
-        <p:spPr>
-          <a:xfrm>
-            <a:off x="276225" y="1152525"/>
-            <a:ext cx="11639550" cy="4552950"/>
-          </a:xfrm>
-          <a:prstGeom prst="rect">
-            <a:avLst/>
-          </a:prstGeom>
-        </p:spPr>
-      </p:pic>
-      <p:sp>
-        <p:nvSpPr>
-          <p:cNvPr id="5" name="Rechthoek 4"/>
-          <p:cNvSpPr/>
-          <p:nvPr/>
-        </p:nvSpPr>
-        <p:spPr>
-          <a:xfrm>
-            <a:off x="307910" y="4264090"/>
-            <a:ext cx="737119" cy="223934"/>
-          </a:xfrm>
-          <a:prstGeom prst="rect">
-            <a:avLst/>
-          </a:prstGeom>
-          <a:solidFill>
-            <a:srgbClr val="9C5D90">
-              <a:alpha val="50196"/>
-            </a:srgbClr>
-          </a:solidFill>
-        </p:spPr>
-        <p:style>
-          <a:lnRef idx="2">
-            <a:schemeClr val="accent1">
-              <a:shade val="50000"/>
-            </a:schemeClr>
-          </a:lnRef>
-          <a:fillRef idx="1">
-            <a:schemeClr val="accent1"/>
-          </a:fillRef>
-          <a:effectRef idx="0">
-            <a:schemeClr val="accent1"/>
-          </a:effectRef>
-          <a:fontRef idx="minor">
-            <a:schemeClr val="lt1"/>
-          </a:fontRef>
-        </p:style>
-        <p:txBody>
-          <a:bodyPr rtlCol="0" anchor="ctr"/>
-          <a:lstStyle/>
-          <a:p>
-            <a:pPr algn="ctr"/>
-            <a:endParaRPr lang="nl-BE"/>
-          </a:p>
-        </p:txBody>
-      </p:sp>
-      <p:sp>
-        <p:nvSpPr>
-          <p:cNvPr id="6" name="Rechthoek 5"/>
-          <p:cNvSpPr/>
-          <p:nvPr/>
-        </p:nvSpPr>
-        <p:spPr>
-          <a:xfrm>
-            <a:off x="4929674" y="1393371"/>
-            <a:ext cx="737119" cy="223934"/>
-          </a:xfrm>
-          <a:prstGeom prst="rect">
-            <a:avLst/>
-          </a:prstGeom>
-          <a:solidFill>
-            <a:srgbClr val="9C5D90">
-              <a:alpha val="50196"/>
-            </a:srgbClr>
-          </a:solidFill>
-        </p:spPr>
-        <p:style>
-          <a:lnRef idx="2">
-            <a:schemeClr val="accent1">
-              <a:shade val="50000"/>
-            </a:schemeClr>
-          </a:lnRef>
-          <a:fillRef idx="1">
-            <a:schemeClr val="accent1"/>
-          </a:fillRef>
-          <a:effectRef idx="0">
-            <a:schemeClr val="accent1"/>
-          </a:effectRef>
-          <a:fontRef idx="minor">
-            <a:schemeClr val="lt1"/>
-          </a:fontRef>
-        </p:style>
-        <p:txBody>
-          <a:bodyPr rtlCol="0" anchor="ctr"/>
-          <a:lstStyle/>
-          <a:p>
-            <a:pPr algn="ctr"/>
-            <a:endParaRPr lang="nl-BE"/>
-          </a:p>
-        </p:txBody>
-      </p:sp>
-      <p:sp>
-        <p:nvSpPr>
-          <p:cNvPr id="7" name="Rechthoek 6"/>
-          <p:cNvSpPr/>
-          <p:nvPr/>
-        </p:nvSpPr>
-        <p:spPr>
-          <a:xfrm>
-            <a:off x="4192555" y="4460031"/>
-            <a:ext cx="1900335" cy="223936"/>
-          </a:xfrm>
-          <a:prstGeom prst="rect">
-            <a:avLst/>
-          </a:prstGeom>
-          <a:solidFill>
-            <a:srgbClr val="9C5D90">
-              <a:alpha val="50196"/>
-            </a:srgbClr>
-          </a:solidFill>
-        </p:spPr>
-        <p:style>
-          <a:lnRef idx="2">
-            <a:schemeClr val="accent1">
-              <a:shade val="50000"/>
-            </a:schemeClr>
-          </a:lnRef>
-          <a:fillRef idx="1">
-            <a:schemeClr val="accent1"/>
-          </a:fillRef>
-          <a:effectRef idx="0">
-            <a:schemeClr val="accent1"/>
-          </a:effectRef>
-          <a:fontRef idx="minor">
-            <a:schemeClr val="lt1"/>
-          </a:fontRef>
-        </p:style>
-        <p:txBody>
-          <a:bodyPr rtlCol="0" anchor="ctr"/>
-          <a:lstStyle/>
-          <a:p>
-            <a:pPr algn="ctr"/>
-            <a:endParaRPr lang="nl-BE"/>
-          </a:p>
-        </p:txBody>
-      </p:sp>
-    </p:spTree>
-    <p:extLst>
-      <p:ext uri="{BB962C8B-B14F-4D97-AF65-F5344CB8AC3E}">
-        <p14:creationId xmlns:p14="http://schemas.microsoft.com/office/powerpoint/2010/main" val="3240805425"/>
-      </p:ext>
-    </p:extLst>
-  </p:cSld>
-  <p:clrMapOvr>
-    <a:masterClrMapping/>
-  </p:clrMapOvr>
-  <p:timing>
-    <p:tnLst>
-      <p:par>
-        <p:cTn id="1" dur="indefinite" restart="never" nodeType="tmRoot"/>
-      </p:par>
-    </p:tnLst>
-  </p:timing>
-</p:sld>
-</file>
-
-<file path=ppt/slides/slide34.xml><?xml version="1.0" encoding="utf-8"?>
-<p:sld xmlns:a="http://schemas.openxmlformats.org/drawingml/2006/main" xmlns:r="http://schemas.openxmlformats.org/officeDocument/2006/relationships" xmlns:p="http://schemas.openxmlformats.org/presentationml/2006/main">
-  <p:cSld>
-    <p:spTree>
-      <p:nvGrpSpPr>
-        <p:cNvPr id="1" name=""/>
-        <p:cNvGrpSpPr/>
-        <p:nvPr/>
-      </p:nvGrpSpPr>
-      <p:grpSpPr>
-        <a:xfrm>
-          <a:off x="0" y="0"/>
-          <a:ext cx="0" cy="0"/>
-          <a:chOff x="0" y="0"/>
-          <a:chExt cx="0" cy="0"/>
-        </a:xfrm>
-      </p:grpSpPr>
-      <p:sp>
-        <p:nvSpPr>
-          <p:cNvPr id="2" name="Titel 1"/>
-          <p:cNvSpPr>
-            <a:spLocks noGrp="1"/>
-          </p:cNvSpPr>
-          <p:nvPr>
-            <p:ph type="title"/>
-          </p:nvPr>
-        </p:nvSpPr>
-        <p:spPr/>
-        <p:txBody>
-          <a:bodyPr/>
-          <a:lstStyle/>
-          <a:p>
-            <a:endParaRPr lang="nl-BE"/>
-          </a:p>
-        </p:txBody>
-      </p:sp>
-      <p:sp>
-        <p:nvSpPr>
-          <p:cNvPr id="3" name="Tijdelijke aanduiding voor inhoud 2"/>
-          <p:cNvSpPr>
-            <a:spLocks noGrp="1"/>
-          </p:cNvSpPr>
-          <p:nvPr>
-            <p:ph idx="1"/>
-          </p:nvPr>
-        </p:nvSpPr>
-        <p:spPr/>
-        <p:txBody>
-          <a:bodyPr/>
-          <a:lstStyle/>
-          <a:p>
-            <a:endParaRPr lang="nl-BE"/>
-          </a:p>
-        </p:txBody>
-      </p:sp>
-    </p:spTree>
-    <p:extLst>
-      <p:ext uri="{BB962C8B-B14F-4D97-AF65-F5344CB8AC3E}">
-        <p14:creationId xmlns:p14="http://schemas.microsoft.com/office/powerpoint/2010/main" val="76186825"/>
-      </p:ext>
-    </p:extLst>
-  </p:cSld>
-  <p:clrMapOvr>
-    <a:masterClrMapping/>
-  </p:clrMapOvr>
-  <p:timing>
-    <p:tnLst>
-      <p:par>
-        <p:cTn id="1" dur="indefinite" restart="never" nodeType="tmRoot"/>
       </p:par>
     </p:tnLst>
   </p:timing>

</xml_diff>